<commit_message>
Atualizacao do grafico do projeto
</commit_message>
<xml_diff>
--- a/Arquitetura Computacional/Gráficos do projetos.pptx
+++ b/Arquitetura Computacional/Gráficos do projetos.pptx
@@ -3836,7 +3836,7 @@
           <a:p>
             <a:fld id="{5F6DACC4-796C-4CAB-B04B-16BEA72ADF2E}" type="datetimeFigureOut">
               <a:rPr lang="pt-BR" smtClean="0"/>
-              <a:t>15/10/2020</a:t>
+              <a:t>26/10/2020</a:t>
             </a:fld>
             <a:endParaRPr lang="pt-BR"/>
           </a:p>
@@ -4034,7 +4034,7 @@
           <a:p>
             <a:fld id="{5F6DACC4-796C-4CAB-B04B-16BEA72ADF2E}" type="datetimeFigureOut">
               <a:rPr lang="pt-BR" smtClean="0"/>
-              <a:t>15/10/2020</a:t>
+              <a:t>26/10/2020</a:t>
             </a:fld>
             <a:endParaRPr lang="pt-BR"/>
           </a:p>
@@ -4242,7 +4242,7 @@
           <a:p>
             <a:fld id="{5F6DACC4-796C-4CAB-B04B-16BEA72ADF2E}" type="datetimeFigureOut">
               <a:rPr lang="pt-BR" smtClean="0"/>
-              <a:t>15/10/2020</a:t>
+              <a:t>26/10/2020</a:t>
             </a:fld>
             <a:endParaRPr lang="pt-BR"/>
           </a:p>
@@ -4440,7 +4440,7 @@
           <a:p>
             <a:fld id="{5F6DACC4-796C-4CAB-B04B-16BEA72ADF2E}" type="datetimeFigureOut">
               <a:rPr lang="pt-BR" smtClean="0"/>
-              <a:t>15/10/2020</a:t>
+              <a:t>26/10/2020</a:t>
             </a:fld>
             <a:endParaRPr lang="pt-BR"/>
           </a:p>
@@ -4715,7 +4715,7 @@
           <a:p>
             <a:fld id="{5F6DACC4-796C-4CAB-B04B-16BEA72ADF2E}" type="datetimeFigureOut">
               <a:rPr lang="pt-BR" smtClean="0"/>
-              <a:t>15/10/2020</a:t>
+              <a:t>26/10/2020</a:t>
             </a:fld>
             <a:endParaRPr lang="pt-BR"/>
           </a:p>
@@ -4980,7 +4980,7 @@
           <a:p>
             <a:fld id="{5F6DACC4-796C-4CAB-B04B-16BEA72ADF2E}" type="datetimeFigureOut">
               <a:rPr lang="pt-BR" smtClean="0"/>
-              <a:t>15/10/2020</a:t>
+              <a:t>26/10/2020</a:t>
             </a:fld>
             <a:endParaRPr lang="pt-BR"/>
           </a:p>
@@ -5392,7 +5392,7 @@
           <a:p>
             <a:fld id="{5F6DACC4-796C-4CAB-B04B-16BEA72ADF2E}" type="datetimeFigureOut">
               <a:rPr lang="pt-BR" smtClean="0"/>
-              <a:t>15/10/2020</a:t>
+              <a:t>26/10/2020</a:t>
             </a:fld>
             <a:endParaRPr lang="pt-BR"/>
           </a:p>
@@ -5533,7 +5533,7 @@
           <a:p>
             <a:fld id="{5F6DACC4-796C-4CAB-B04B-16BEA72ADF2E}" type="datetimeFigureOut">
               <a:rPr lang="pt-BR" smtClean="0"/>
-              <a:t>15/10/2020</a:t>
+              <a:t>26/10/2020</a:t>
             </a:fld>
             <a:endParaRPr lang="pt-BR"/>
           </a:p>
@@ -5646,7 +5646,7 @@
           <a:p>
             <a:fld id="{5F6DACC4-796C-4CAB-B04B-16BEA72ADF2E}" type="datetimeFigureOut">
               <a:rPr lang="pt-BR" smtClean="0"/>
-              <a:t>15/10/2020</a:t>
+              <a:t>26/10/2020</a:t>
             </a:fld>
             <a:endParaRPr lang="pt-BR"/>
           </a:p>
@@ -5957,7 +5957,7 @@
           <a:p>
             <a:fld id="{5F6DACC4-796C-4CAB-B04B-16BEA72ADF2E}" type="datetimeFigureOut">
               <a:rPr lang="pt-BR" smtClean="0"/>
-              <a:t>15/10/2020</a:t>
+              <a:t>26/10/2020</a:t>
             </a:fld>
             <a:endParaRPr lang="pt-BR"/>
           </a:p>
@@ -6245,7 +6245,7 @@
           <a:p>
             <a:fld id="{5F6DACC4-796C-4CAB-B04B-16BEA72ADF2E}" type="datetimeFigureOut">
               <a:rPr lang="pt-BR" smtClean="0"/>
-              <a:t>15/10/2020</a:t>
+              <a:t>26/10/2020</a:t>
             </a:fld>
             <a:endParaRPr lang="pt-BR"/>
           </a:p>
@@ -6489,7 +6489,7 @@
           <a:p>
             <a:fld id="{5F6DACC4-796C-4CAB-B04B-16BEA72ADF2E}" type="datetimeFigureOut">
               <a:rPr lang="pt-BR" smtClean="0"/>
-              <a:t>15/10/2020</a:t>
+              <a:t>26/10/2020</a:t>
             </a:fld>
             <a:endParaRPr lang="pt-BR"/>
           </a:p>
@@ -7512,8 +7512,8 @@
         </p:nvSpPr>
         <p:spPr>
           <a:xfrm>
-            <a:off x="954156" y="675862"/>
-            <a:ext cx="9780105" cy="584775"/>
+            <a:off x="4159524" y="688240"/>
+            <a:ext cx="3369366" cy="584775"/>
           </a:xfrm>
           <a:prstGeom prst="rect">
             <a:avLst/>
@@ -7556,7 +7556,7 @@
           <p:nvPr>
             <p:extLst>
               <p:ext uri="{D42A27DB-BD31-4B8C-83A1-F6EECF244321}">
-                <p14:modId xmlns:p14="http://schemas.microsoft.com/office/powerpoint/2010/main" val="3983402856"/>
+                <p14:modId xmlns:p14="http://schemas.microsoft.com/office/powerpoint/2010/main" val="3173787445"/>
               </p:ext>
             </p:extLst>
           </p:nvPr>
@@ -7650,6 +7650,24 @@
                     </a:p>
                   </a:txBody>
                   <a:tcPr>
+                    <a:lnL w="12700" cap="flat" cmpd="sng" algn="ctr">
+                      <a:solidFill>
+                        <a:schemeClr val="tx1"/>
+                      </a:solidFill>
+                      <a:prstDash val="solid"/>
+                      <a:round/>
+                      <a:headEnd type="none" w="med" len="med"/>
+                      <a:tailEnd type="none" w="med" len="med"/>
+                    </a:lnL>
+                    <a:lnT w="12700" cap="flat" cmpd="sng" algn="ctr">
+                      <a:solidFill>
+                        <a:schemeClr val="tx1"/>
+                      </a:solidFill>
+                      <a:prstDash val="solid"/>
+                      <a:round/>
+                      <a:headEnd type="none" w="med" len="med"/>
+                      <a:tailEnd type="none" w="med" len="med"/>
+                    </a:lnT>
                     <a:solidFill>
                       <a:srgbClr val="4DD4E3"/>
                     </a:solidFill>
@@ -7696,6 +7714,15 @@
                     </a:p>
                   </a:txBody>
                   <a:tcPr>
+                    <a:lnT w="12700" cap="flat" cmpd="sng" algn="ctr">
+                      <a:solidFill>
+                        <a:schemeClr val="tx1"/>
+                      </a:solidFill>
+                      <a:prstDash val="solid"/>
+                      <a:round/>
+                      <a:headEnd type="none" w="med" len="med"/>
+                      <a:tailEnd type="none" w="med" len="med"/>
+                    </a:lnT>
                     <a:solidFill>
                       <a:srgbClr val="F2E93E"/>
                     </a:solidFill>
@@ -7752,6 +7779,15 @@
                     </a:p>
                   </a:txBody>
                   <a:tcPr>
+                    <a:lnT w="12700" cap="flat" cmpd="sng" algn="ctr">
+                      <a:solidFill>
+                        <a:schemeClr val="tx1"/>
+                      </a:solidFill>
+                      <a:prstDash val="solid"/>
+                      <a:round/>
+                      <a:headEnd type="none" w="med" len="med"/>
+                      <a:tailEnd type="none" w="med" len="med"/>
+                    </a:lnT>
                     <a:solidFill>
                       <a:srgbClr val="4DCA23"/>
                     </a:solidFill>
@@ -7798,6 +7834,15 @@
                     </a:p>
                   </a:txBody>
                   <a:tcPr>
+                    <a:lnT w="12700" cap="flat" cmpd="sng" algn="ctr">
+                      <a:solidFill>
+                        <a:schemeClr val="tx1"/>
+                      </a:solidFill>
+                      <a:prstDash val="solid"/>
+                      <a:round/>
+                      <a:headEnd type="none" w="med" len="med"/>
+                      <a:tailEnd type="none" w="med" len="med"/>
+                    </a:lnT>
                     <a:solidFill>
                       <a:srgbClr val="F59337"/>
                     </a:solidFill>
@@ -7844,6 +7889,24 @@
                     </a:p>
                   </a:txBody>
                   <a:tcPr>
+                    <a:lnR w="12700" cap="flat" cmpd="sng" algn="ctr">
+                      <a:solidFill>
+                        <a:schemeClr val="tx1"/>
+                      </a:solidFill>
+                      <a:prstDash val="solid"/>
+                      <a:round/>
+                      <a:headEnd type="none" w="med" len="med"/>
+                      <a:tailEnd type="none" w="med" len="med"/>
+                    </a:lnR>
+                    <a:lnT w="12700" cap="flat" cmpd="sng" algn="ctr">
+                      <a:solidFill>
+                        <a:schemeClr val="tx1"/>
+                      </a:solidFill>
+                      <a:prstDash val="solid"/>
+                      <a:round/>
+                      <a:headEnd type="none" w="med" len="med"/>
+                      <a:tailEnd type="none" w="med" len="med"/>
+                    </a:lnT>
                     <a:solidFill>
                       <a:srgbClr val="F7646A"/>
                     </a:solidFill>
@@ -7875,6 +7938,24 @@
                     </a:p>
                   </a:txBody>
                   <a:tcPr>
+                    <a:lnL w="12700" cap="flat" cmpd="sng" algn="ctr">
+                      <a:solidFill>
+                        <a:schemeClr val="tx1"/>
+                      </a:solidFill>
+                      <a:prstDash val="solid"/>
+                      <a:round/>
+                      <a:headEnd type="none" w="med" len="med"/>
+                      <a:tailEnd type="none" w="med" len="med"/>
+                    </a:lnL>
+                    <a:lnB w="12700" cap="flat" cmpd="sng" algn="ctr">
+                      <a:solidFill>
+                        <a:schemeClr val="tx1"/>
+                      </a:solidFill>
+                      <a:prstDash val="solid"/>
+                      <a:round/>
+                      <a:headEnd type="none" w="med" len="med"/>
+                      <a:tailEnd type="none" w="med" len="med"/>
+                    </a:lnB>
                     <a:solidFill>
                       <a:srgbClr val="4DD4E3"/>
                     </a:solidFill>
@@ -7899,6 +7980,15 @@
                     </a:p>
                   </a:txBody>
                   <a:tcPr>
+                    <a:lnB w="12700" cap="flat" cmpd="sng" algn="ctr">
+                      <a:solidFill>
+                        <a:schemeClr val="tx1"/>
+                      </a:solidFill>
+                      <a:prstDash val="solid"/>
+                      <a:round/>
+                      <a:headEnd type="none" w="med" len="med"/>
+                      <a:tailEnd type="none" w="med" len="med"/>
+                    </a:lnB>
                     <a:solidFill>
                       <a:srgbClr val="F2E93E"/>
                     </a:solidFill>
@@ -7923,6 +8013,15 @@
                     </a:p>
                   </a:txBody>
                   <a:tcPr>
+                    <a:lnB w="12700" cap="flat" cmpd="sng" algn="ctr">
+                      <a:solidFill>
+                        <a:schemeClr val="tx1"/>
+                      </a:solidFill>
+                      <a:prstDash val="solid"/>
+                      <a:round/>
+                      <a:headEnd type="none" w="med" len="med"/>
+                      <a:tailEnd type="none" w="med" len="med"/>
+                    </a:lnB>
                     <a:solidFill>
                       <a:srgbClr val="4DCA23"/>
                     </a:solidFill>
@@ -7947,6 +8046,15 @@
                     </a:p>
                   </a:txBody>
                   <a:tcPr>
+                    <a:lnB w="12700" cap="flat" cmpd="sng" algn="ctr">
+                      <a:solidFill>
+                        <a:schemeClr val="tx1"/>
+                      </a:solidFill>
+                      <a:prstDash val="solid"/>
+                      <a:round/>
+                      <a:headEnd type="none" w="med" len="med"/>
+                      <a:tailEnd type="none" w="med" len="med"/>
+                    </a:lnB>
                     <a:solidFill>
                       <a:srgbClr val="F59337"/>
                     </a:solidFill>
@@ -7971,6 +8079,24 @@
                     </a:p>
                   </a:txBody>
                   <a:tcPr>
+                    <a:lnR w="12700" cap="flat" cmpd="sng" algn="ctr">
+                      <a:solidFill>
+                        <a:schemeClr val="tx1"/>
+                      </a:solidFill>
+                      <a:prstDash val="solid"/>
+                      <a:round/>
+                      <a:headEnd type="none" w="med" len="med"/>
+                      <a:tailEnd type="none" w="med" len="med"/>
+                    </a:lnR>
+                    <a:lnB w="12700" cap="flat" cmpd="sng" algn="ctr">
+                      <a:solidFill>
+                        <a:schemeClr val="tx1"/>
+                      </a:solidFill>
+                      <a:prstDash val="solid"/>
+                      <a:round/>
+                      <a:headEnd type="none" w="med" len="med"/>
+                      <a:tailEnd type="none" w="med" len="med"/>
+                    </a:lnB>
                     <a:solidFill>
                       <a:srgbClr val="F7646A"/>
                     </a:solidFill>
@@ -8001,7 +8127,7 @@
           <p:nvPr>
             <p:extLst>
               <p:ext uri="{D42A27DB-BD31-4B8C-83A1-F6EECF244321}">
-                <p14:modId xmlns:p14="http://schemas.microsoft.com/office/powerpoint/2010/main" val="3688635258"/>
+                <p14:modId xmlns:p14="http://schemas.microsoft.com/office/powerpoint/2010/main" val="1322434380"/>
               </p:ext>
             </p:extLst>
           </p:nvPr>
@@ -8106,6 +8232,24 @@
                     </a:p>
                   </a:txBody>
                   <a:tcPr>
+                    <a:lnL w="12700" cap="flat" cmpd="sng" algn="ctr">
+                      <a:solidFill>
+                        <a:schemeClr val="tx1"/>
+                      </a:solidFill>
+                      <a:prstDash val="solid"/>
+                      <a:round/>
+                      <a:headEnd type="none" w="med" len="med"/>
+                      <a:tailEnd type="none" w="med" len="med"/>
+                    </a:lnL>
+                    <a:lnT w="12700" cap="flat" cmpd="sng" algn="ctr">
+                      <a:solidFill>
+                        <a:schemeClr val="tx1"/>
+                      </a:solidFill>
+                      <a:prstDash val="solid"/>
+                      <a:round/>
+                      <a:headEnd type="none" w="med" len="med"/>
+                      <a:tailEnd type="none" w="med" len="med"/>
+                    </a:lnT>
                     <a:solidFill>
                       <a:srgbClr val="4DD4E3"/>
                     </a:solidFill>
@@ -8152,6 +8296,15 @@
                     </a:p>
                   </a:txBody>
                   <a:tcPr>
+                    <a:lnT w="12700" cap="flat" cmpd="sng" algn="ctr">
+                      <a:solidFill>
+                        <a:schemeClr val="tx1"/>
+                      </a:solidFill>
+                      <a:prstDash val="solid"/>
+                      <a:round/>
+                      <a:headEnd type="none" w="med" len="med"/>
+                      <a:tailEnd type="none" w="med" len="med"/>
+                    </a:lnT>
                     <a:solidFill>
                       <a:srgbClr val="F2E93E"/>
                     </a:solidFill>
@@ -8208,6 +8361,15 @@
                     </a:p>
                   </a:txBody>
                   <a:tcPr>
+                    <a:lnT w="12700" cap="flat" cmpd="sng" algn="ctr">
+                      <a:solidFill>
+                        <a:schemeClr val="tx1"/>
+                      </a:solidFill>
+                      <a:prstDash val="solid"/>
+                      <a:round/>
+                      <a:headEnd type="none" w="med" len="med"/>
+                      <a:tailEnd type="none" w="med" len="med"/>
+                    </a:lnT>
                     <a:solidFill>
                       <a:srgbClr val="4DCA23"/>
                     </a:solidFill>
@@ -8254,6 +8416,15 @@
                     </a:p>
                   </a:txBody>
                   <a:tcPr>
+                    <a:lnT w="12700" cap="flat" cmpd="sng" algn="ctr">
+                      <a:solidFill>
+                        <a:schemeClr val="tx1"/>
+                      </a:solidFill>
+                      <a:prstDash val="solid"/>
+                      <a:round/>
+                      <a:headEnd type="none" w="med" len="med"/>
+                      <a:tailEnd type="none" w="med" len="med"/>
+                    </a:lnT>
                     <a:solidFill>
                       <a:srgbClr val="F59337"/>
                     </a:solidFill>
@@ -8300,6 +8471,24 @@
                     </a:p>
                   </a:txBody>
                   <a:tcPr>
+                    <a:lnR w="12700" cap="flat" cmpd="sng" algn="ctr">
+                      <a:solidFill>
+                        <a:schemeClr val="tx1"/>
+                      </a:solidFill>
+                      <a:prstDash val="solid"/>
+                      <a:round/>
+                      <a:headEnd type="none" w="med" len="med"/>
+                      <a:tailEnd type="none" w="med" len="med"/>
+                    </a:lnR>
+                    <a:lnT w="12700" cap="flat" cmpd="sng" algn="ctr">
+                      <a:solidFill>
+                        <a:schemeClr val="tx1"/>
+                      </a:solidFill>
+                      <a:prstDash val="solid"/>
+                      <a:round/>
+                      <a:headEnd type="none" w="med" len="med"/>
+                      <a:tailEnd type="none" w="med" len="med"/>
+                    </a:lnT>
                     <a:solidFill>
                       <a:srgbClr val="F7646A"/>
                     </a:solidFill>
@@ -8331,6 +8520,24 @@
                     </a:p>
                   </a:txBody>
                   <a:tcPr>
+                    <a:lnL w="12700" cap="flat" cmpd="sng" algn="ctr">
+                      <a:solidFill>
+                        <a:schemeClr val="tx1"/>
+                      </a:solidFill>
+                      <a:prstDash val="solid"/>
+                      <a:round/>
+                      <a:headEnd type="none" w="med" len="med"/>
+                      <a:tailEnd type="none" w="med" len="med"/>
+                    </a:lnL>
+                    <a:lnB w="12700" cap="flat" cmpd="sng" algn="ctr">
+                      <a:solidFill>
+                        <a:schemeClr val="tx1"/>
+                      </a:solidFill>
+                      <a:prstDash val="solid"/>
+                      <a:round/>
+                      <a:headEnd type="none" w="med" len="med"/>
+                      <a:tailEnd type="none" w="med" len="med"/>
+                    </a:lnB>
                     <a:solidFill>
                       <a:srgbClr val="4DD4E3"/>
                     </a:solidFill>
@@ -8355,6 +8562,15 @@
                     </a:p>
                   </a:txBody>
                   <a:tcPr>
+                    <a:lnB w="12700" cap="flat" cmpd="sng" algn="ctr">
+                      <a:solidFill>
+                        <a:schemeClr val="tx1"/>
+                      </a:solidFill>
+                      <a:prstDash val="solid"/>
+                      <a:round/>
+                      <a:headEnd type="none" w="med" len="med"/>
+                      <a:tailEnd type="none" w="med" len="med"/>
+                    </a:lnB>
                     <a:solidFill>
                       <a:srgbClr val="F2E93E"/>
                     </a:solidFill>
@@ -8379,6 +8595,15 @@
                     </a:p>
                   </a:txBody>
                   <a:tcPr>
+                    <a:lnB w="12700" cap="flat" cmpd="sng" algn="ctr">
+                      <a:solidFill>
+                        <a:schemeClr val="tx1"/>
+                      </a:solidFill>
+                      <a:prstDash val="solid"/>
+                      <a:round/>
+                      <a:headEnd type="none" w="med" len="med"/>
+                      <a:tailEnd type="none" w="med" len="med"/>
+                    </a:lnB>
                     <a:solidFill>
                       <a:srgbClr val="4DCA23"/>
                     </a:solidFill>
@@ -8403,6 +8628,15 @@
                     </a:p>
                   </a:txBody>
                   <a:tcPr>
+                    <a:lnB w="12700" cap="flat" cmpd="sng" algn="ctr">
+                      <a:solidFill>
+                        <a:schemeClr val="tx1"/>
+                      </a:solidFill>
+                      <a:prstDash val="solid"/>
+                      <a:round/>
+                      <a:headEnd type="none" w="med" len="med"/>
+                      <a:tailEnd type="none" w="med" len="med"/>
+                    </a:lnB>
                     <a:solidFill>
                       <a:srgbClr val="F59337"/>
                     </a:solidFill>
@@ -8427,6 +8661,24 @@
                     </a:p>
                   </a:txBody>
                   <a:tcPr>
+                    <a:lnR w="12700" cap="flat" cmpd="sng" algn="ctr">
+                      <a:solidFill>
+                        <a:schemeClr val="tx1"/>
+                      </a:solidFill>
+                      <a:prstDash val="solid"/>
+                      <a:round/>
+                      <a:headEnd type="none" w="med" len="med"/>
+                      <a:tailEnd type="none" w="med" len="med"/>
+                    </a:lnR>
+                    <a:lnB w="12700" cap="flat" cmpd="sng" algn="ctr">
+                      <a:solidFill>
+                        <a:schemeClr val="tx1"/>
+                      </a:solidFill>
+                      <a:prstDash val="solid"/>
+                      <a:round/>
+                      <a:headEnd type="none" w="med" len="med"/>
+                      <a:tailEnd type="none" w="med" len="med"/>
+                    </a:lnB>
                     <a:solidFill>
                       <a:srgbClr val="F7646A"/>
                     </a:solidFill>
@@ -8456,8 +8708,8 @@
         </p:nvSpPr>
         <p:spPr>
           <a:xfrm>
-            <a:off x="954155" y="3283227"/>
-            <a:ext cx="9780105" cy="584775"/>
+            <a:off x="4857719" y="3283228"/>
+            <a:ext cx="1972977" cy="584775"/>
           </a:xfrm>
           <a:prstGeom prst="rect">
             <a:avLst/>
@@ -8502,6 +8754,85 @@
         <p:blipFill>
           <a:blip r:embed="rId2">
             <a:extLst>
+              <a:ext uri="{BEBA8EAE-BF5A-486C-A8C5-ECC9F3942E4B}">
+                <a14:imgProps xmlns:a14="http://schemas.microsoft.com/office/drawing/2010/main">
+                  <a14:imgLayer r:embed="rId3">
+                    <a14:imgEffect>
+                      <a14:backgroundRemoval t="2667" b="98667" l="9778" r="89778">
+                        <a14:foregroundMark x1="44000" y1="13778" x2="44000" y2="13778"/>
+                        <a14:foregroundMark x1="44000" y1="6667" x2="44000" y2="6667"/>
+                        <a14:foregroundMark x1="49778" y1="2667" x2="49778" y2="2667"/>
+                        <a14:foregroundMark x1="57333" y1="96444" x2="57333" y2="96444"/>
+                        <a14:foregroundMark x1="51556" y1="98667" x2="51556" y2="98667"/>
+                        <a14:foregroundMark x1="43111" y1="32000" x2="43111" y2="32000"/>
+                        <a14:foregroundMark x1="28000" y1="14222" x2="28000" y2="14222"/>
+                        <a14:foregroundMark x1="30667" y1="24889" x2="30667" y2="24889"/>
+                        <a14:foregroundMark x1="28000" y1="36000" x2="28000" y2="36000"/>
+                        <a14:foregroundMark x1="27556" y1="48889" x2="27556" y2="48889"/>
+                        <a14:foregroundMark x1="30667" y1="59111" x2="30667" y2="59111"/>
+                        <a14:foregroundMark x1="48444" y1="52889" x2="48444" y2="52889"/>
+                        <a14:foregroundMark x1="45778" y1="60444" x2="45778" y2="60444"/>
+                        <a14:foregroundMark x1="45778" y1="60444" x2="45778" y2="60444"/>
+                        <a14:foregroundMark x1="45333" y1="54222" x2="45333" y2="54222"/>
+                        <a14:foregroundMark x1="46222" y1="51556" x2="46222" y2="51556"/>
+                        <a14:foregroundMark x1="47111" y1="48889" x2="47556" y2="47556"/>
+                        <a14:foregroundMark x1="48889" y1="36889" x2="48889" y2="36889"/>
+                        <a14:foregroundMark x1="48889" y1="24444" x2="48889" y2="24444"/>
+                        <a14:foregroundMark x1="45778" y1="34222" x2="45778" y2="34222"/>
+                        <a14:foregroundMark x1="45778" y1="42667" x2="45778" y2="42667"/>
+                        <a14:foregroundMark x1="47556" y1="22222" x2="47556" y2="22222"/>
+                        <a14:foregroundMark x1="50222" y1="16889" x2="50222" y2="16889"/>
+                        <a14:foregroundMark x1="51556" y1="16889" x2="51556" y2="16889"/>
+                        <a14:foregroundMark x1="55556" y1="12444" x2="55556" y2="12444"/>
+                        <a14:foregroundMark x1="52444" y1="11111" x2="52444" y2="11111"/>
+                        <a14:foregroundMark x1="47111" y1="15556" x2="47111" y2="15556"/>
+                        <a14:foregroundMark x1="52889" y1="12444" x2="52889" y2="12444"/>
+                        <a14:foregroundMark x1="54667" y1="12000" x2="54667" y2="12000"/>
+                        <a14:foregroundMark x1="58222" y1="12000" x2="58222" y2="12000"/>
+                        <a14:foregroundMark x1="54222" y1="11111" x2="54222" y2="11111"/>
+                        <a14:foregroundMark x1="60889" y1="21778" x2="60889" y2="21778"/>
+                        <a14:foregroundMark x1="60000" y1="27556" x2="60000" y2="27556"/>
+                        <a14:foregroundMark x1="58222" y1="36444" x2="58222" y2="37778"/>
+                        <a14:foregroundMark x1="58667" y1="40000" x2="58667" y2="40000"/>
+                        <a14:foregroundMark x1="60444" y1="43111" x2="62222" y2="46667"/>
+                        <a14:foregroundMark x1="62222" y1="46667" x2="62222" y2="46667"/>
+                        <a14:foregroundMark x1="62222" y1="48889" x2="62222" y2="48889"/>
+                        <a14:foregroundMark x1="62222" y1="52000" x2="64444" y2="62222"/>
+                        <a14:foregroundMark x1="57778" y1="64000" x2="46222" y2="66667"/>
+                        <a14:foregroundMark x1="41778" y1="70667" x2="59556" y2="64444"/>
+                        <a14:foregroundMark x1="61778" y1="67556" x2="61778" y2="80444"/>
+                        <a14:foregroundMark x1="47111" y1="74667" x2="47111" y2="74667"/>
+                        <a14:foregroundMark x1="43111" y1="76889" x2="43111" y2="76889"/>
+                        <a14:foregroundMark x1="39111" y1="85333" x2="39111" y2="85333"/>
+                        <a14:foregroundMark x1="40444" y1="80000" x2="40444" y2="80000"/>
+                        <a14:foregroundMark x1="40889" y1="80000" x2="40889" y2="80000"/>
+                        <a14:foregroundMark x1="41333" y1="80000" x2="41333" y2="80000"/>
+                        <a14:foregroundMark x1="48444" y1="85778" x2="48444" y2="85778"/>
+                        <a14:foregroundMark x1="48889" y1="86222" x2="48889" y2="86222"/>
+                        <a14:foregroundMark x1="45778" y1="86667" x2="45778" y2="86667"/>
+                        <a14:foregroundMark x1="45778" y1="86667" x2="45778" y2="86667"/>
+                        <a14:foregroundMark x1="43556" y1="89333" x2="43556" y2="89333"/>
+                        <a14:foregroundMark x1="43556" y1="89333" x2="43556" y2="89333"/>
+                        <a14:foregroundMark x1="58667" y1="91556" x2="58667" y2="91556"/>
+                        <a14:foregroundMark x1="58667" y1="91556" x2="58667" y2="91556"/>
+                        <a14:foregroundMark x1="59111" y1="90222" x2="59111" y2="90222"/>
+                        <a14:foregroundMark x1="42667" y1="90667" x2="42667" y2="92000"/>
+                        <a14:foregroundMark x1="50667" y1="93333" x2="50667" y2="93333"/>
+                        <a14:foregroundMark x1="53333" y1="93333" x2="53333" y2="93333"/>
+                        <a14:foregroundMark x1="53778" y1="93333" x2="53778" y2="93333"/>
+                        <a14:foregroundMark x1="57778" y1="93333" x2="57778" y2="93333"/>
+                        <a14:foregroundMark x1="60000" y1="91111" x2="60444" y2="89333"/>
+                        <a14:foregroundMark x1="61778" y1="88000" x2="61778" y2="88000"/>
+                        <a14:foregroundMark x1="61778" y1="87556" x2="61778" y2="87556"/>
+                        <a14:foregroundMark x1="63556" y1="84889" x2="63556" y2="84889"/>
+                        <a14:foregroundMark x1="66222" y1="82667" x2="66222" y2="82667"/>
+                        <a14:foregroundMark x1="66667" y1="80889" x2="66667" y2="80889"/>
+                        <a14:foregroundMark x1="66667" y1="77778" x2="66667" y2="77778"/>
+                      </a14:backgroundRemoval>
+                    </a14:imgEffect>
+                  </a14:imgLayer>
+                </a14:imgProps>
+              </a:ext>
               <a:ext uri="{28A0092B-C50C-407E-A947-70E740481C1C}">
                 <a14:useLocalDpi xmlns:a14="http://schemas.microsoft.com/office/drawing/2010/main" val="0"/>
               </a:ext>
@@ -8514,7 +8845,7 @@
         </p:blipFill>
         <p:spPr bwMode="auto">
           <a:xfrm>
-            <a:off x="7364895" y="791097"/>
+            <a:off x="7364895" y="791432"/>
             <a:ext cx="508346" cy="508346"/>
           </a:xfrm>
           <a:prstGeom prst="rect">
@@ -8547,7 +8878,50 @@
           <p:nvPr/>
         </p:nvPicPr>
         <p:blipFill>
-          <a:blip r:embed="rId3"/>
+          <a:blip r:embed="rId4">
+            <a:extLst>
+              <a:ext uri="{BEBA8EAE-BF5A-486C-A8C5-ECC9F3942E4B}">
+                <a14:imgProps xmlns:a14="http://schemas.microsoft.com/office/drawing/2010/main">
+                  <a14:imgLayer r:embed="rId5">
+                    <a14:imgEffect>
+                      <a14:backgroundRemoval t="3556" b="96889" l="9778" r="89778">
+                        <a14:foregroundMark x1="50667" y1="6667" x2="50667" y2="6667"/>
+                        <a14:foregroundMark x1="49333" y1="3556" x2="49333" y2="3556"/>
+                        <a14:foregroundMark x1="53778" y1="91111" x2="53778" y2="91111"/>
+                        <a14:foregroundMark x1="49778" y1="92000" x2="49778" y2="92000"/>
+                        <a14:foregroundMark x1="52000" y1="96000" x2="52000" y2="96000"/>
+                        <a14:foregroundMark x1="55556" y1="79111" x2="55556" y2="79111"/>
+                        <a14:foregroundMark x1="56444" y1="78667" x2="56444" y2="78667"/>
+                        <a14:foregroundMark x1="56889" y1="82667" x2="56889" y2="82667"/>
+                        <a14:foregroundMark x1="56889" y1="78222" x2="56889" y2="78222"/>
+                        <a14:foregroundMark x1="55556" y1="77333" x2="55556" y2="77333"/>
+                        <a14:foregroundMark x1="56444" y1="75556" x2="56444" y2="75556"/>
+                        <a14:foregroundMark x1="59111" y1="76889" x2="60889" y2="77778"/>
+                        <a14:foregroundMark x1="60889" y1="77778" x2="60889" y2="77778"/>
+                        <a14:foregroundMark x1="61778" y1="83111" x2="61778" y2="83111"/>
+                        <a14:foregroundMark x1="46667" y1="80889" x2="48000" y2="80444"/>
+                        <a14:foregroundMark x1="56444" y1="76889" x2="56444" y2="76889"/>
+                        <a14:foregroundMark x1="58222" y1="76444" x2="60000" y2="76000"/>
+                        <a14:foregroundMark x1="62222" y1="76000" x2="62222" y2="76000"/>
+                        <a14:foregroundMark x1="64444" y1="77333" x2="64444" y2="77333"/>
+                        <a14:foregroundMark x1="64444" y1="78667" x2="64444" y2="78667"/>
+                        <a14:foregroundMark x1="64889" y1="82222" x2="64889" y2="82222"/>
+                        <a14:foregroundMark x1="63111" y1="83556" x2="57778" y2="84000"/>
+                        <a14:foregroundMark x1="57333" y1="84000" x2="57333" y2="84000"/>
+                        <a14:foregroundMark x1="49778" y1="96889" x2="49778" y2="96889"/>
+                        <a14:foregroundMark x1="36000" y1="76889" x2="67111" y2="48889"/>
+                        <a14:foregroundMark x1="39556" y1="49333" x2="42222" y2="44889"/>
+                        <a14:foregroundMark x1="36000" y1="49333" x2="36000" y2="49333"/>
+                        <a14:foregroundMark x1="45333" y1="44000" x2="45333" y2="44000"/>
+                        <a14:foregroundMark x1="36000" y1="40889" x2="36000" y2="40889"/>
+                        <a14:foregroundMark x1="46222" y1="52444" x2="46222" y2="52444"/>
+                      </a14:backgroundRemoval>
+                    </a14:imgEffect>
+                  </a14:imgLayer>
+                </a14:imgProps>
+              </a:ext>
+            </a:extLst>
+          </a:blip>
           <a:stretch>
             <a:fillRect/>
           </a:stretch>
@@ -8562,6 +8936,1032 @@
           </a:prstGeom>
         </p:spPr>
       </p:pic>
+      <p:cxnSp>
+        <p:nvCxnSpPr>
+          <p:cNvPr id="20" name="Conector de Seta Reta 19">
+            <a:extLst>
+              <a:ext uri="{FF2B5EF4-FFF2-40B4-BE49-F238E27FC236}">
+                <a16:creationId xmlns:a16="http://schemas.microsoft.com/office/drawing/2014/main" id="{0FC363BF-6480-494F-ACCB-039C783B3FDF}"/>
+              </a:ext>
+            </a:extLst>
+          </p:cNvPr>
+          <p:cNvCxnSpPr>
+            <a:cxnSpLocks/>
+          </p:cNvCxnSpPr>
+          <p:nvPr/>
+        </p:nvCxnSpPr>
+        <p:spPr>
+          <a:xfrm>
+            <a:off x="5043600" y="2886364"/>
+            <a:ext cx="1800000" cy="0"/>
+          </a:xfrm>
+          <a:prstGeom prst="straightConnector1">
+            <a:avLst/>
+          </a:prstGeom>
+          <a:ln w="38100">
+            <a:headEnd type="triangle"/>
+            <a:tailEnd type="triangle"/>
+          </a:ln>
+        </p:spPr>
+        <p:style>
+          <a:lnRef idx="1">
+            <a:schemeClr val="accent3"/>
+          </a:lnRef>
+          <a:fillRef idx="0">
+            <a:schemeClr val="accent3"/>
+          </a:fillRef>
+          <a:effectRef idx="0">
+            <a:schemeClr val="accent3"/>
+          </a:effectRef>
+          <a:fontRef idx="minor">
+            <a:schemeClr val="tx1"/>
+          </a:fontRef>
+        </p:style>
+      </p:cxnSp>
+      <p:sp>
+        <p:nvSpPr>
+          <p:cNvPr id="21" name="CaixaDeTexto 20">
+            <a:extLst>
+              <a:ext uri="{FF2B5EF4-FFF2-40B4-BE49-F238E27FC236}">
+                <a16:creationId xmlns:a16="http://schemas.microsoft.com/office/drawing/2014/main" id="{3A69BE39-607E-4267-8C14-B4D16474613C}"/>
+              </a:ext>
+            </a:extLst>
+          </p:cNvPr>
+          <p:cNvSpPr txBox="1"/>
+          <p:nvPr/>
+        </p:nvSpPr>
+        <p:spPr>
+          <a:xfrm>
+            <a:off x="5057780" y="2875225"/>
+            <a:ext cx="1771639" cy="323165"/>
+          </a:xfrm>
+          <a:prstGeom prst="rect">
+            <a:avLst/>
+          </a:prstGeom>
+          <a:noFill/>
+        </p:spPr>
+        <p:txBody>
+          <a:bodyPr wrap="none" rtlCol="0">
+            <a:spAutoFit/>
+          </a:bodyPr>
+          <a:lstStyle/>
+          <a:p>
+            <a:r>
+              <a:rPr lang="pt-BR" sz="1500" b="1" dirty="0">
+                <a:ln w="22225">
+                  <a:noFill/>
+                  <a:prstDash val="solid"/>
+                </a:ln>
+                <a:solidFill>
+                  <a:srgbClr val="4DCA23"/>
+                </a:solidFill>
+                <a:latin typeface="Arial" panose="020B0604020202020204" pitchFamily="34" charset="0"/>
+                <a:cs typeface="Arial" panose="020B0604020202020204" pitchFamily="34" charset="0"/>
+              </a:rPr>
+              <a:t>De 3,6 °C à 6,4 °C</a:t>
+            </a:r>
+          </a:p>
+        </p:txBody>
+      </p:sp>
+      <p:cxnSp>
+        <p:nvCxnSpPr>
+          <p:cNvPr id="30" name="Conector de Seta Reta 29">
+            <a:extLst>
+              <a:ext uri="{FF2B5EF4-FFF2-40B4-BE49-F238E27FC236}">
+                <a16:creationId xmlns:a16="http://schemas.microsoft.com/office/drawing/2014/main" id="{7D9C8C40-85AC-41F8-B938-95FB0DCC5C6C}"/>
+              </a:ext>
+            </a:extLst>
+          </p:cNvPr>
+          <p:cNvCxnSpPr>
+            <a:cxnSpLocks/>
+          </p:cNvCxnSpPr>
+          <p:nvPr/>
+        </p:nvCxnSpPr>
+        <p:spPr>
+          <a:xfrm>
+            <a:off x="7016968" y="2886364"/>
+            <a:ext cx="1800000" cy="0"/>
+          </a:xfrm>
+          <a:prstGeom prst="straightConnector1">
+            <a:avLst/>
+          </a:prstGeom>
+          <a:ln w="38100">
+            <a:headEnd type="triangle"/>
+            <a:tailEnd type="triangle"/>
+          </a:ln>
+        </p:spPr>
+        <p:style>
+          <a:lnRef idx="1">
+            <a:schemeClr val="accent4"/>
+          </a:lnRef>
+          <a:fillRef idx="0">
+            <a:schemeClr val="accent4"/>
+          </a:fillRef>
+          <a:effectRef idx="0">
+            <a:schemeClr val="accent4"/>
+          </a:effectRef>
+          <a:fontRef idx="minor">
+            <a:schemeClr val="tx1"/>
+          </a:fontRef>
+        </p:style>
+      </p:cxnSp>
+      <p:sp>
+        <p:nvSpPr>
+          <p:cNvPr id="31" name="CaixaDeTexto 30">
+            <a:extLst>
+              <a:ext uri="{FF2B5EF4-FFF2-40B4-BE49-F238E27FC236}">
+                <a16:creationId xmlns:a16="http://schemas.microsoft.com/office/drawing/2014/main" id="{1FD7084A-1589-4E18-B10F-1F9979EFA05A}"/>
+              </a:ext>
+            </a:extLst>
+          </p:cNvPr>
+          <p:cNvSpPr txBox="1"/>
+          <p:nvPr/>
+        </p:nvSpPr>
+        <p:spPr>
+          <a:xfrm>
+            <a:off x="7037094" y="2884196"/>
+            <a:ext cx="1771639" cy="323165"/>
+          </a:xfrm>
+          <a:prstGeom prst="rect">
+            <a:avLst/>
+          </a:prstGeom>
+          <a:noFill/>
+        </p:spPr>
+        <p:txBody>
+          <a:bodyPr wrap="none" rtlCol="0">
+            <a:spAutoFit/>
+          </a:bodyPr>
+          <a:lstStyle/>
+          <a:p>
+            <a:r>
+              <a:rPr lang="pt-BR" sz="1500" b="1" dirty="0">
+                <a:ln w="22225">
+                  <a:noFill/>
+                  <a:prstDash val="solid"/>
+                </a:ln>
+                <a:solidFill>
+                  <a:srgbClr val="F59337"/>
+                </a:solidFill>
+                <a:latin typeface="Arial" panose="020B0604020202020204" pitchFamily="34" charset="0"/>
+                <a:cs typeface="Arial" panose="020B0604020202020204" pitchFamily="34" charset="0"/>
+              </a:rPr>
+              <a:t>De 6,5 °C à 7,9 °C</a:t>
+            </a:r>
+          </a:p>
+        </p:txBody>
+      </p:sp>
+      <p:cxnSp>
+        <p:nvCxnSpPr>
+          <p:cNvPr id="34" name="Conector de Seta Reta 33">
+            <a:extLst>
+              <a:ext uri="{FF2B5EF4-FFF2-40B4-BE49-F238E27FC236}">
+                <a16:creationId xmlns:a16="http://schemas.microsoft.com/office/drawing/2014/main" id="{9C16164C-E60C-4178-95A3-D6E94BC90A22}"/>
+              </a:ext>
+            </a:extLst>
+          </p:cNvPr>
+          <p:cNvCxnSpPr>
+            <a:cxnSpLocks/>
+          </p:cNvCxnSpPr>
+          <p:nvPr/>
+        </p:nvCxnSpPr>
+        <p:spPr>
+          <a:xfrm>
+            <a:off x="3070232" y="2886363"/>
+            <a:ext cx="1800000" cy="0"/>
+          </a:xfrm>
+          <a:prstGeom prst="straightConnector1">
+            <a:avLst/>
+          </a:prstGeom>
+          <a:ln w="38100">
+            <a:headEnd type="triangle"/>
+            <a:tailEnd type="triangle"/>
+          </a:ln>
+        </p:spPr>
+        <p:style>
+          <a:lnRef idx="1">
+            <a:schemeClr val="accent2"/>
+          </a:lnRef>
+          <a:fillRef idx="0">
+            <a:schemeClr val="accent2"/>
+          </a:fillRef>
+          <a:effectRef idx="0">
+            <a:schemeClr val="accent2"/>
+          </a:effectRef>
+          <a:fontRef idx="minor">
+            <a:schemeClr val="tx1"/>
+          </a:fontRef>
+        </p:style>
+      </p:cxnSp>
+      <p:sp>
+        <p:nvSpPr>
+          <p:cNvPr id="35" name="CaixaDeTexto 34">
+            <a:extLst>
+              <a:ext uri="{FF2B5EF4-FFF2-40B4-BE49-F238E27FC236}">
+                <a16:creationId xmlns:a16="http://schemas.microsoft.com/office/drawing/2014/main" id="{9BF69B43-E99D-4C7C-86CF-0A66536679B7}"/>
+              </a:ext>
+            </a:extLst>
+          </p:cNvPr>
+          <p:cNvSpPr txBox="1"/>
+          <p:nvPr/>
+        </p:nvSpPr>
+        <p:spPr>
+          <a:xfrm>
+            <a:off x="3086080" y="2891148"/>
+            <a:ext cx="1771639" cy="323165"/>
+          </a:xfrm>
+          <a:prstGeom prst="rect">
+            <a:avLst/>
+          </a:prstGeom>
+          <a:noFill/>
+        </p:spPr>
+        <p:txBody>
+          <a:bodyPr wrap="none" rtlCol="0">
+            <a:spAutoFit/>
+          </a:bodyPr>
+          <a:lstStyle/>
+          <a:p>
+            <a:r>
+              <a:rPr lang="pt-BR" sz="1500" b="1" dirty="0">
+                <a:ln w="22225">
+                  <a:noFill/>
+                  <a:prstDash val="solid"/>
+                </a:ln>
+                <a:solidFill>
+                  <a:srgbClr val="F2E93E"/>
+                </a:solidFill>
+                <a:latin typeface="Arial" panose="020B0604020202020204" pitchFamily="34" charset="0"/>
+                <a:cs typeface="Arial" panose="020B0604020202020204" pitchFamily="34" charset="0"/>
+              </a:rPr>
+              <a:t>De 2,1 °C à 3,5 °C</a:t>
+            </a:r>
+          </a:p>
+        </p:txBody>
+      </p:sp>
+      <p:cxnSp>
+        <p:nvCxnSpPr>
+          <p:cNvPr id="36" name="Conector de Seta Reta 35">
+            <a:extLst>
+              <a:ext uri="{FF2B5EF4-FFF2-40B4-BE49-F238E27FC236}">
+                <a16:creationId xmlns:a16="http://schemas.microsoft.com/office/drawing/2014/main" id="{7001407E-6534-410B-A1C8-24A505075136}"/>
+              </a:ext>
+            </a:extLst>
+          </p:cNvPr>
+          <p:cNvCxnSpPr>
+            <a:cxnSpLocks/>
+          </p:cNvCxnSpPr>
+          <p:nvPr/>
+        </p:nvCxnSpPr>
+        <p:spPr>
+          <a:xfrm>
+            <a:off x="1127132" y="2886363"/>
+            <a:ext cx="1800000" cy="0"/>
+          </a:xfrm>
+          <a:prstGeom prst="straightConnector1">
+            <a:avLst/>
+          </a:prstGeom>
+          <a:ln w="38100">
+            <a:headEnd type="triangle"/>
+            <a:tailEnd type="triangle"/>
+          </a:ln>
+        </p:spPr>
+        <p:style>
+          <a:lnRef idx="1">
+            <a:schemeClr val="accent1"/>
+          </a:lnRef>
+          <a:fillRef idx="0">
+            <a:schemeClr val="accent1"/>
+          </a:fillRef>
+          <a:effectRef idx="0">
+            <a:schemeClr val="accent1"/>
+          </a:effectRef>
+          <a:fontRef idx="minor">
+            <a:schemeClr val="tx1"/>
+          </a:fontRef>
+        </p:style>
+      </p:cxnSp>
+      <p:sp>
+        <p:nvSpPr>
+          <p:cNvPr id="32" name="CaixaDeTexto 31">
+            <a:extLst>
+              <a:ext uri="{FF2B5EF4-FFF2-40B4-BE49-F238E27FC236}">
+                <a16:creationId xmlns:a16="http://schemas.microsoft.com/office/drawing/2014/main" id="{51CE5417-FA99-4694-9C75-5B1B0A87F55B}"/>
+              </a:ext>
+            </a:extLst>
+          </p:cNvPr>
+          <p:cNvSpPr txBox="1"/>
+          <p:nvPr/>
+        </p:nvSpPr>
+        <p:spPr>
+          <a:xfrm>
+            <a:off x="1184550" y="2886363"/>
+            <a:ext cx="1679675" cy="784830"/>
+          </a:xfrm>
+          <a:prstGeom prst="rect">
+            <a:avLst/>
+          </a:prstGeom>
+          <a:noFill/>
+        </p:spPr>
+        <p:txBody>
+          <a:bodyPr wrap="square" rtlCol="0">
+            <a:spAutoFit/>
+          </a:bodyPr>
+          <a:lstStyle/>
+          <a:p>
+            <a:pPr algn="ctr"/>
+            <a:r>
+              <a:rPr lang="pt-BR" sz="1500" b="1" dirty="0">
+                <a:ln w="22225">
+                  <a:noFill/>
+                  <a:prstDash val="solid"/>
+                </a:ln>
+                <a:solidFill>
+                  <a:srgbClr val="4DD4E3"/>
+                </a:solidFill>
+                <a:latin typeface="Arial" panose="020B0604020202020204" pitchFamily="34" charset="0"/>
+                <a:cs typeface="Arial" panose="020B0604020202020204" pitchFamily="34" charset="0"/>
+              </a:rPr>
+              <a:t>Menos de 2°C</a:t>
+            </a:r>
+          </a:p>
+          <a:p>
+            <a:pPr algn="ctr"/>
+            <a:r>
+              <a:rPr lang="pt-BR" sz="1500" b="1" dirty="0">
+                <a:ln w="22225">
+                  <a:noFill/>
+                  <a:prstDash val="solid"/>
+                </a:ln>
+                <a:solidFill>
+                  <a:srgbClr val="4DD4E3"/>
+                </a:solidFill>
+                <a:latin typeface="Arial" panose="020B0604020202020204" pitchFamily="34" charset="0"/>
+                <a:cs typeface="Arial" panose="020B0604020202020204" pitchFamily="34" charset="0"/>
+              </a:rPr>
+              <a:t>Medicamento</a:t>
+            </a:r>
+          </a:p>
+          <a:p>
+            <a:pPr algn="ctr"/>
+            <a:r>
+              <a:rPr lang="pt-BR" sz="1500" b="1" dirty="0">
+                <a:ln w="22225">
+                  <a:noFill/>
+                  <a:prstDash val="solid"/>
+                </a:ln>
+                <a:solidFill>
+                  <a:srgbClr val="4DD4E3"/>
+                </a:solidFill>
+                <a:latin typeface="Arial" panose="020B0604020202020204" pitchFamily="34" charset="0"/>
+                <a:cs typeface="Arial" panose="020B0604020202020204" pitchFamily="34" charset="0"/>
+              </a:rPr>
+              <a:t>Comprometido</a:t>
+            </a:r>
+          </a:p>
+        </p:txBody>
+      </p:sp>
+      <p:cxnSp>
+        <p:nvCxnSpPr>
+          <p:cNvPr id="39" name="Conector de Seta Reta 38">
+            <a:extLst>
+              <a:ext uri="{FF2B5EF4-FFF2-40B4-BE49-F238E27FC236}">
+                <a16:creationId xmlns:a16="http://schemas.microsoft.com/office/drawing/2014/main" id="{89730701-5D20-493B-87FF-5752E408BE73}"/>
+              </a:ext>
+            </a:extLst>
+          </p:cNvPr>
+          <p:cNvCxnSpPr>
+            <a:cxnSpLocks/>
+          </p:cNvCxnSpPr>
+          <p:nvPr/>
+        </p:nvCxnSpPr>
+        <p:spPr>
+          <a:xfrm>
+            <a:off x="8955073" y="2886363"/>
+            <a:ext cx="1800000" cy="0"/>
+          </a:xfrm>
+          <a:prstGeom prst="straightConnector1">
+            <a:avLst/>
+          </a:prstGeom>
+          <a:ln w="38100">
+            <a:solidFill>
+              <a:srgbClr val="F7646A"/>
+            </a:solidFill>
+            <a:headEnd type="triangle"/>
+            <a:tailEnd type="triangle"/>
+          </a:ln>
+        </p:spPr>
+        <p:style>
+          <a:lnRef idx="1">
+            <a:schemeClr val="accent4"/>
+          </a:lnRef>
+          <a:fillRef idx="0">
+            <a:schemeClr val="accent4"/>
+          </a:fillRef>
+          <a:effectRef idx="0">
+            <a:schemeClr val="accent4"/>
+          </a:effectRef>
+          <a:fontRef idx="minor">
+            <a:schemeClr val="tx1"/>
+          </a:fontRef>
+        </p:style>
+      </p:cxnSp>
+      <p:cxnSp>
+        <p:nvCxnSpPr>
+          <p:cNvPr id="44" name="Conector de Seta Reta 43">
+            <a:extLst>
+              <a:ext uri="{FF2B5EF4-FFF2-40B4-BE49-F238E27FC236}">
+                <a16:creationId xmlns:a16="http://schemas.microsoft.com/office/drawing/2014/main" id="{CAC97E5F-8309-45D2-967E-DA433E07A8E0}"/>
+              </a:ext>
+            </a:extLst>
+          </p:cNvPr>
+          <p:cNvCxnSpPr>
+            <a:cxnSpLocks/>
+          </p:cNvCxnSpPr>
+          <p:nvPr/>
+        </p:nvCxnSpPr>
+        <p:spPr>
+          <a:xfrm>
+            <a:off x="5043600" y="5533946"/>
+            <a:ext cx="1800000" cy="0"/>
+          </a:xfrm>
+          <a:prstGeom prst="straightConnector1">
+            <a:avLst/>
+          </a:prstGeom>
+          <a:ln w="38100">
+            <a:headEnd type="triangle"/>
+            <a:tailEnd type="triangle"/>
+          </a:ln>
+        </p:spPr>
+        <p:style>
+          <a:lnRef idx="1">
+            <a:schemeClr val="accent3"/>
+          </a:lnRef>
+          <a:fillRef idx="0">
+            <a:schemeClr val="accent3"/>
+          </a:fillRef>
+          <a:effectRef idx="0">
+            <a:schemeClr val="accent3"/>
+          </a:effectRef>
+          <a:fontRef idx="minor">
+            <a:schemeClr val="tx1"/>
+          </a:fontRef>
+        </p:style>
+      </p:cxnSp>
+      <p:sp>
+        <p:nvSpPr>
+          <p:cNvPr id="45" name="CaixaDeTexto 44">
+            <a:extLst>
+              <a:ext uri="{FF2B5EF4-FFF2-40B4-BE49-F238E27FC236}">
+                <a16:creationId xmlns:a16="http://schemas.microsoft.com/office/drawing/2014/main" id="{434C502E-0ABA-4C48-8E43-7D5B73D1F6E9}"/>
+              </a:ext>
+            </a:extLst>
+          </p:cNvPr>
+          <p:cNvSpPr txBox="1"/>
+          <p:nvPr/>
+        </p:nvSpPr>
+        <p:spPr>
+          <a:xfrm>
+            <a:off x="4973953" y="5552398"/>
+            <a:ext cx="1986441" cy="323165"/>
+          </a:xfrm>
+          <a:prstGeom prst="rect">
+            <a:avLst/>
+          </a:prstGeom>
+          <a:noFill/>
+        </p:spPr>
+        <p:txBody>
+          <a:bodyPr wrap="none" rtlCol="0">
+            <a:spAutoFit/>
+          </a:bodyPr>
+          <a:lstStyle/>
+          <a:p>
+            <a:r>
+              <a:rPr lang="pt-BR" sz="1500" b="1" dirty="0">
+                <a:ln w="22225">
+                  <a:noFill/>
+                  <a:prstDash val="solid"/>
+                </a:ln>
+                <a:solidFill>
+                  <a:srgbClr val="4DCA23"/>
+                </a:solidFill>
+                <a:latin typeface="Arial" panose="020B0604020202020204" pitchFamily="34" charset="0"/>
+                <a:cs typeface="Arial" panose="020B0604020202020204" pitchFamily="34" charset="0"/>
+              </a:rPr>
+              <a:t>De 47,6 °C à 62,4 °C</a:t>
+            </a:r>
+          </a:p>
+        </p:txBody>
+      </p:sp>
+      <p:cxnSp>
+        <p:nvCxnSpPr>
+          <p:cNvPr id="46" name="Conector de Seta Reta 45">
+            <a:extLst>
+              <a:ext uri="{FF2B5EF4-FFF2-40B4-BE49-F238E27FC236}">
+                <a16:creationId xmlns:a16="http://schemas.microsoft.com/office/drawing/2014/main" id="{A9001C02-F299-4D1E-BAEB-30DCB51257EC}"/>
+              </a:ext>
+            </a:extLst>
+          </p:cNvPr>
+          <p:cNvCxnSpPr>
+            <a:cxnSpLocks/>
+          </p:cNvCxnSpPr>
+          <p:nvPr/>
+        </p:nvCxnSpPr>
+        <p:spPr>
+          <a:xfrm>
+            <a:off x="7016968" y="5533946"/>
+            <a:ext cx="1800000" cy="0"/>
+          </a:xfrm>
+          <a:prstGeom prst="straightConnector1">
+            <a:avLst/>
+          </a:prstGeom>
+          <a:ln w="38100">
+            <a:headEnd type="triangle"/>
+            <a:tailEnd type="triangle"/>
+          </a:ln>
+        </p:spPr>
+        <p:style>
+          <a:lnRef idx="1">
+            <a:schemeClr val="accent4"/>
+          </a:lnRef>
+          <a:fillRef idx="0">
+            <a:schemeClr val="accent4"/>
+          </a:fillRef>
+          <a:effectRef idx="0">
+            <a:schemeClr val="accent4"/>
+          </a:effectRef>
+          <a:fontRef idx="minor">
+            <a:schemeClr val="tx1"/>
+          </a:fontRef>
+        </p:style>
+      </p:cxnSp>
+      <p:sp>
+        <p:nvSpPr>
+          <p:cNvPr id="47" name="CaixaDeTexto 46">
+            <a:extLst>
+              <a:ext uri="{FF2B5EF4-FFF2-40B4-BE49-F238E27FC236}">
+                <a16:creationId xmlns:a16="http://schemas.microsoft.com/office/drawing/2014/main" id="{0E49CC1A-5980-4110-B4D1-238BE72F9C97}"/>
+              </a:ext>
+            </a:extLst>
+          </p:cNvPr>
+          <p:cNvSpPr txBox="1"/>
+          <p:nvPr/>
+        </p:nvSpPr>
+        <p:spPr>
+          <a:xfrm>
+            <a:off x="6984092" y="5538731"/>
+            <a:ext cx="1986441" cy="323165"/>
+          </a:xfrm>
+          <a:prstGeom prst="rect">
+            <a:avLst/>
+          </a:prstGeom>
+          <a:noFill/>
+        </p:spPr>
+        <p:txBody>
+          <a:bodyPr wrap="none" rtlCol="0">
+            <a:spAutoFit/>
+          </a:bodyPr>
+          <a:lstStyle/>
+          <a:p>
+            <a:r>
+              <a:rPr lang="pt-BR" sz="1500" b="1" dirty="0">
+                <a:ln w="22225">
+                  <a:noFill/>
+                  <a:prstDash val="solid"/>
+                </a:ln>
+                <a:solidFill>
+                  <a:srgbClr val="F59337"/>
+                </a:solidFill>
+                <a:latin typeface="Arial" panose="020B0604020202020204" pitchFamily="34" charset="0"/>
+                <a:cs typeface="Arial" panose="020B0604020202020204" pitchFamily="34" charset="0"/>
+              </a:rPr>
+              <a:t>De 62,5 °C à 69,9 °C</a:t>
+            </a:r>
+          </a:p>
+        </p:txBody>
+      </p:sp>
+      <p:cxnSp>
+        <p:nvCxnSpPr>
+          <p:cNvPr id="48" name="Conector de Seta Reta 47">
+            <a:extLst>
+              <a:ext uri="{FF2B5EF4-FFF2-40B4-BE49-F238E27FC236}">
+                <a16:creationId xmlns:a16="http://schemas.microsoft.com/office/drawing/2014/main" id="{0D2BD3B4-C208-4D46-A247-8ED7787D8F53}"/>
+              </a:ext>
+            </a:extLst>
+          </p:cNvPr>
+          <p:cNvCxnSpPr>
+            <a:cxnSpLocks/>
+          </p:cNvCxnSpPr>
+          <p:nvPr/>
+        </p:nvCxnSpPr>
+        <p:spPr>
+          <a:xfrm>
+            <a:off x="3070232" y="5533945"/>
+            <a:ext cx="1800000" cy="0"/>
+          </a:xfrm>
+          <a:prstGeom prst="straightConnector1">
+            <a:avLst/>
+          </a:prstGeom>
+          <a:ln w="38100">
+            <a:headEnd type="triangle"/>
+            <a:tailEnd type="triangle"/>
+          </a:ln>
+        </p:spPr>
+        <p:style>
+          <a:lnRef idx="1">
+            <a:schemeClr val="accent2"/>
+          </a:lnRef>
+          <a:fillRef idx="0">
+            <a:schemeClr val="accent2"/>
+          </a:fillRef>
+          <a:effectRef idx="0">
+            <a:schemeClr val="accent2"/>
+          </a:effectRef>
+          <a:fontRef idx="minor">
+            <a:schemeClr val="tx1"/>
+          </a:fontRef>
+        </p:style>
+      </p:cxnSp>
+      <p:sp>
+        <p:nvSpPr>
+          <p:cNvPr id="49" name="CaixaDeTexto 48">
+            <a:extLst>
+              <a:ext uri="{FF2B5EF4-FFF2-40B4-BE49-F238E27FC236}">
+                <a16:creationId xmlns:a16="http://schemas.microsoft.com/office/drawing/2014/main" id="{0B4DD527-A521-40DE-B5E2-F35D4584409E}"/>
+              </a:ext>
+            </a:extLst>
+          </p:cNvPr>
+          <p:cNvSpPr txBox="1"/>
+          <p:nvPr/>
+        </p:nvSpPr>
+        <p:spPr>
+          <a:xfrm>
+            <a:off x="2999141" y="5538731"/>
+            <a:ext cx="1986441" cy="323165"/>
+          </a:xfrm>
+          <a:prstGeom prst="rect">
+            <a:avLst/>
+          </a:prstGeom>
+          <a:noFill/>
+        </p:spPr>
+        <p:txBody>
+          <a:bodyPr wrap="none" rtlCol="0">
+            <a:spAutoFit/>
+          </a:bodyPr>
+          <a:lstStyle/>
+          <a:p>
+            <a:r>
+              <a:rPr lang="pt-BR" sz="1500" b="1" dirty="0">
+                <a:ln w="22225">
+                  <a:noFill/>
+                  <a:prstDash val="solid"/>
+                </a:ln>
+                <a:solidFill>
+                  <a:srgbClr val="F2E93E"/>
+                </a:solidFill>
+                <a:latin typeface="Arial" panose="020B0604020202020204" pitchFamily="34" charset="0"/>
+                <a:cs typeface="Arial" panose="020B0604020202020204" pitchFamily="34" charset="0"/>
+              </a:rPr>
+              <a:t>De 40,1 °C à 47,5 °C</a:t>
+            </a:r>
+          </a:p>
+        </p:txBody>
+      </p:sp>
+      <p:cxnSp>
+        <p:nvCxnSpPr>
+          <p:cNvPr id="50" name="Conector de Seta Reta 49">
+            <a:extLst>
+              <a:ext uri="{FF2B5EF4-FFF2-40B4-BE49-F238E27FC236}">
+                <a16:creationId xmlns:a16="http://schemas.microsoft.com/office/drawing/2014/main" id="{26AAEAAE-3FED-4B90-81EE-D91329CAD3E8}"/>
+              </a:ext>
+            </a:extLst>
+          </p:cNvPr>
+          <p:cNvCxnSpPr>
+            <a:cxnSpLocks/>
+          </p:cNvCxnSpPr>
+          <p:nvPr/>
+        </p:nvCxnSpPr>
+        <p:spPr>
+          <a:xfrm>
+            <a:off x="1127132" y="5533945"/>
+            <a:ext cx="1800000" cy="0"/>
+          </a:xfrm>
+          <a:prstGeom prst="straightConnector1">
+            <a:avLst/>
+          </a:prstGeom>
+          <a:ln w="38100">
+            <a:headEnd type="triangle"/>
+            <a:tailEnd type="triangle"/>
+          </a:ln>
+        </p:spPr>
+        <p:style>
+          <a:lnRef idx="1">
+            <a:schemeClr val="accent1"/>
+          </a:lnRef>
+          <a:fillRef idx="0">
+            <a:schemeClr val="accent1"/>
+          </a:fillRef>
+          <a:effectRef idx="0">
+            <a:schemeClr val="accent1"/>
+          </a:effectRef>
+          <a:fontRef idx="minor">
+            <a:schemeClr val="tx1"/>
+          </a:fontRef>
+        </p:style>
+      </p:cxnSp>
+      <p:sp>
+        <p:nvSpPr>
+          <p:cNvPr id="51" name="CaixaDeTexto 50">
+            <a:extLst>
+              <a:ext uri="{FF2B5EF4-FFF2-40B4-BE49-F238E27FC236}">
+                <a16:creationId xmlns:a16="http://schemas.microsoft.com/office/drawing/2014/main" id="{65F32678-CB45-40EB-A9DE-1AC9CC00A3A8}"/>
+              </a:ext>
+            </a:extLst>
+          </p:cNvPr>
+          <p:cNvSpPr txBox="1"/>
+          <p:nvPr/>
+        </p:nvSpPr>
+        <p:spPr>
+          <a:xfrm>
+            <a:off x="1264593" y="5534344"/>
+            <a:ext cx="1552027" cy="784830"/>
+          </a:xfrm>
+          <a:prstGeom prst="rect">
+            <a:avLst/>
+          </a:prstGeom>
+          <a:noFill/>
+        </p:spPr>
+        <p:txBody>
+          <a:bodyPr wrap="none" rtlCol="0">
+            <a:spAutoFit/>
+          </a:bodyPr>
+          <a:lstStyle/>
+          <a:p>
+            <a:pPr algn="ctr"/>
+            <a:r>
+              <a:rPr lang="pt-BR" sz="1500" b="1" dirty="0">
+                <a:ln w="22225">
+                  <a:noFill/>
+                  <a:prstDash val="solid"/>
+                </a:ln>
+                <a:solidFill>
+                  <a:srgbClr val="4DD4E3"/>
+                </a:solidFill>
+                <a:latin typeface="Arial" panose="020B0604020202020204" pitchFamily="34" charset="0"/>
+                <a:cs typeface="Arial" panose="020B0604020202020204" pitchFamily="34" charset="0"/>
+              </a:rPr>
+              <a:t>Menos de 40%</a:t>
+            </a:r>
+          </a:p>
+          <a:p>
+            <a:pPr algn="ctr"/>
+            <a:r>
+              <a:rPr lang="pt-BR" sz="1500" b="1" dirty="0">
+                <a:ln w="22225">
+                  <a:noFill/>
+                  <a:prstDash val="solid"/>
+                </a:ln>
+                <a:solidFill>
+                  <a:srgbClr val="4DD4E3"/>
+                </a:solidFill>
+                <a:latin typeface="Arial" panose="020B0604020202020204" pitchFamily="34" charset="0"/>
+                <a:cs typeface="Arial" panose="020B0604020202020204" pitchFamily="34" charset="0"/>
+              </a:rPr>
+              <a:t>Medicamento</a:t>
+            </a:r>
+          </a:p>
+          <a:p>
+            <a:pPr algn="ctr"/>
+            <a:r>
+              <a:rPr lang="pt-BR" sz="1500" b="1" dirty="0">
+                <a:ln w="22225">
+                  <a:noFill/>
+                  <a:prstDash val="solid"/>
+                </a:ln>
+                <a:solidFill>
+                  <a:srgbClr val="4DD4E3"/>
+                </a:solidFill>
+                <a:latin typeface="Arial" panose="020B0604020202020204" pitchFamily="34" charset="0"/>
+                <a:cs typeface="Arial" panose="020B0604020202020204" pitchFamily="34" charset="0"/>
+              </a:rPr>
+              <a:t>Comprometido</a:t>
+            </a:r>
+          </a:p>
+        </p:txBody>
+      </p:sp>
+      <p:cxnSp>
+        <p:nvCxnSpPr>
+          <p:cNvPr id="52" name="Conector de Seta Reta 51">
+            <a:extLst>
+              <a:ext uri="{FF2B5EF4-FFF2-40B4-BE49-F238E27FC236}">
+                <a16:creationId xmlns:a16="http://schemas.microsoft.com/office/drawing/2014/main" id="{1F4CF2A4-7583-432A-BF5C-1E564D72AEBA}"/>
+              </a:ext>
+            </a:extLst>
+          </p:cNvPr>
+          <p:cNvCxnSpPr>
+            <a:cxnSpLocks/>
+          </p:cNvCxnSpPr>
+          <p:nvPr/>
+        </p:nvCxnSpPr>
+        <p:spPr>
+          <a:xfrm>
+            <a:off x="8955073" y="5533945"/>
+            <a:ext cx="1800000" cy="0"/>
+          </a:xfrm>
+          <a:prstGeom prst="straightConnector1">
+            <a:avLst/>
+          </a:prstGeom>
+          <a:ln w="38100">
+            <a:solidFill>
+              <a:srgbClr val="F7646A"/>
+            </a:solidFill>
+            <a:headEnd type="triangle"/>
+            <a:tailEnd type="triangle"/>
+          </a:ln>
+        </p:spPr>
+        <p:style>
+          <a:lnRef idx="1">
+            <a:schemeClr val="accent4"/>
+          </a:lnRef>
+          <a:fillRef idx="0">
+            <a:schemeClr val="accent4"/>
+          </a:fillRef>
+          <a:effectRef idx="0">
+            <a:schemeClr val="accent4"/>
+          </a:effectRef>
+          <a:fontRef idx="minor">
+            <a:schemeClr val="tx1"/>
+          </a:fontRef>
+        </p:style>
+      </p:cxnSp>
+      <p:sp>
+        <p:nvSpPr>
+          <p:cNvPr id="53" name="CaixaDeTexto 52">
+            <a:extLst>
+              <a:ext uri="{FF2B5EF4-FFF2-40B4-BE49-F238E27FC236}">
+                <a16:creationId xmlns:a16="http://schemas.microsoft.com/office/drawing/2014/main" id="{2ABBDB3A-8B9A-4AB9-B814-A5CD008C08FA}"/>
+              </a:ext>
+            </a:extLst>
+          </p:cNvPr>
+          <p:cNvSpPr txBox="1"/>
+          <p:nvPr/>
+        </p:nvSpPr>
+        <p:spPr>
+          <a:xfrm>
+            <a:off x="9154405" y="5513899"/>
+            <a:ext cx="1552027" cy="784830"/>
+          </a:xfrm>
+          <a:prstGeom prst="rect">
+            <a:avLst/>
+          </a:prstGeom>
+          <a:noFill/>
+        </p:spPr>
+        <p:txBody>
+          <a:bodyPr wrap="none" rtlCol="0">
+            <a:spAutoFit/>
+          </a:bodyPr>
+          <a:lstStyle/>
+          <a:p>
+            <a:pPr algn="ctr"/>
+            <a:r>
+              <a:rPr lang="pt-BR" sz="1500" b="1" dirty="0">
+                <a:ln w="22225">
+                  <a:noFill/>
+                  <a:prstDash val="solid"/>
+                </a:ln>
+                <a:solidFill>
+                  <a:srgbClr val="F7646A"/>
+                </a:solidFill>
+                <a:latin typeface="Arial" panose="020B0604020202020204" pitchFamily="34" charset="0"/>
+                <a:cs typeface="Arial" panose="020B0604020202020204" pitchFamily="34" charset="0"/>
+              </a:rPr>
+              <a:t>Mais de 70% </a:t>
+            </a:r>
+          </a:p>
+          <a:p>
+            <a:pPr algn="ctr"/>
+            <a:r>
+              <a:rPr lang="pt-BR" sz="1500" b="1" dirty="0">
+                <a:ln w="22225">
+                  <a:noFill/>
+                  <a:prstDash val="solid"/>
+                </a:ln>
+                <a:solidFill>
+                  <a:srgbClr val="F7646A"/>
+                </a:solidFill>
+                <a:latin typeface="Arial" panose="020B0604020202020204" pitchFamily="34" charset="0"/>
+                <a:cs typeface="Arial" panose="020B0604020202020204" pitchFamily="34" charset="0"/>
+              </a:rPr>
+              <a:t>Medicamento</a:t>
+            </a:r>
+            <a:br>
+              <a:rPr lang="pt-BR" sz="1500" b="1" dirty="0">
+                <a:ln w="22225">
+                  <a:noFill/>
+                  <a:prstDash val="solid"/>
+                </a:ln>
+                <a:solidFill>
+                  <a:srgbClr val="F7646A"/>
+                </a:solidFill>
+                <a:latin typeface="Arial" panose="020B0604020202020204" pitchFamily="34" charset="0"/>
+                <a:cs typeface="Arial" panose="020B0604020202020204" pitchFamily="34" charset="0"/>
+              </a:rPr>
+            </a:br>
+            <a:r>
+              <a:rPr lang="pt-BR" sz="1500" b="1" dirty="0">
+                <a:ln w="22225">
+                  <a:noFill/>
+                  <a:prstDash val="solid"/>
+                </a:ln>
+                <a:solidFill>
+                  <a:srgbClr val="F7646A"/>
+                </a:solidFill>
+                <a:latin typeface="Arial" panose="020B0604020202020204" pitchFamily="34" charset="0"/>
+                <a:cs typeface="Arial" panose="020B0604020202020204" pitchFamily="34" charset="0"/>
+              </a:rPr>
+              <a:t>Comprometido</a:t>
+            </a:r>
+          </a:p>
+        </p:txBody>
+      </p:sp>
+      <p:sp>
+        <p:nvSpPr>
+          <p:cNvPr id="2" name="CaixaDeTexto 1">
+            <a:extLst>
+              <a:ext uri="{FF2B5EF4-FFF2-40B4-BE49-F238E27FC236}">
+                <a16:creationId xmlns:a16="http://schemas.microsoft.com/office/drawing/2014/main" id="{355E5359-C30E-4D52-A2F3-5497A0EC34CC}"/>
+              </a:ext>
+            </a:extLst>
+          </p:cNvPr>
+          <p:cNvSpPr txBox="1"/>
+          <p:nvPr/>
+        </p:nvSpPr>
+        <p:spPr>
+          <a:xfrm>
+            <a:off x="9075398" y="2891148"/>
+            <a:ext cx="1679675" cy="784830"/>
+          </a:xfrm>
+          <a:prstGeom prst="rect">
+            <a:avLst/>
+          </a:prstGeom>
+          <a:noFill/>
+        </p:spPr>
+        <p:txBody>
+          <a:bodyPr wrap="square" rtlCol="0">
+            <a:spAutoFit/>
+          </a:bodyPr>
+          <a:lstStyle/>
+          <a:p>
+            <a:pPr algn="ctr"/>
+            <a:r>
+              <a:rPr lang="pt-BR" sz="1500" b="1" dirty="0">
+                <a:ln w="22225">
+                  <a:noFill/>
+                  <a:prstDash val="solid"/>
+                </a:ln>
+                <a:solidFill>
+                  <a:srgbClr val="F7646A"/>
+                </a:solidFill>
+                <a:latin typeface="Arial" panose="020B0604020202020204" pitchFamily="34" charset="0"/>
+                <a:cs typeface="Arial" panose="020B0604020202020204" pitchFamily="34" charset="0"/>
+              </a:rPr>
+              <a:t>Mais de 8°C</a:t>
+            </a:r>
+          </a:p>
+          <a:p>
+            <a:pPr algn="ctr"/>
+            <a:r>
+              <a:rPr lang="pt-BR" sz="1500" b="1" dirty="0">
+                <a:ln w="22225">
+                  <a:noFill/>
+                  <a:prstDash val="solid"/>
+                </a:ln>
+                <a:solidFill>
+                  <a:srgbClr val="F7646A"/>
+                </a:solidFill>
+                <a:latin typeface="Arial" panose="020B0604020202020204" pitchFamily="34" charset="0"/>
+                <a:cs typeface="Arial" panose="020B0604020202020204" pitchFamily="34" charset="0"/>
+              </a:rPr>
+              <a:t>Medicamento</a:t>
+            </a:r>
+          </a:p>
+          <a:p>
+            <a:pPr algn="ctr"/>
+            <a:r>
+              <a:rPr lang="pt-BR" sz="1500" b="1" dirty="0">
+                <a:ln w="22225">
+                  <a:noFill/>
+                  <a:prstDash val="solid"/>
+                </a:ln>
+                <a:solidFill>
+                  <a:srgbClr val="F7646A"/>
+                </a:solidFill>
+                <a:latin typeface="Arial" panose="020B0604020202020204" pitchFamily="34" charset="0"/>
+                <a:cs typeface="Arial" panose="020B0604020202020204" pitchFamily="34" charset="0"/>
+              </a:rPr>
+              <a:t>Comprometido</a:t>
+            </a:r>
+          </a:p>
+        </p:txBody>
+      </p:sp>
     </p:spTree>
     <p:extLst>
       <p:ext uri="{BB962C8B-B14F-4D97-AF65-F5344CB8AC3E}">

</xml_diff>